<commit_message>
Updates to .NET 7
</commit_message>
<xml_diff>
--- a/2. NET-Standard/dotnet-workshop-netstandard.pptx
+++ b/2. NET-Standard/dotnet-workshop-netstandard.pptx
@@ -8769,7 +8769,7 @@
           <a:p>
             <a:fld id="{148BFE7F-F400-4DD9-B236-B1C0D7AE84D3}" type="datetimeFigureOut">
               <a:rPr lang="en-US" smtClean="0"/>
-              <a:t>4/8/2022</a:t>
+              <a:t>11/17/2022</a:t>
             </a:fld>
             <a:endParaRPr lang="en-US"/>
           </a:p>
@@ -9832,7 +9832,7 @@
                 <a:tabLst/>
                 <a:defRPr/>
               </a:pPr>
-              <a:t>4/8/2022 8:35 AM</a:t>
+              <a:t>11/17/2022 3:04 PM</a:t>
             </a:fld>
             <a:endParaRPr kumimoji="0" lang="en-US" sz="1200" b="0" i="0" u="none" strike="noStrike" kern="1200" cap="none" spc="0" normalizeH="0" baseline="0" noProof="0" dirty="0">
               <a:ln>
@@ -10085,7 +10085,7 @@
           <a:p>
             <a:fld id="{38EEC551-8CDA-4EB6-89BB-2A86C9F091C8}" type="datetime8">
               <a:rPr lang="en-US" smtClean="0"/>
-              <a:t>4/8/2022 8:35 AM</a:t>
+              <a:t>11/17/2022 3:04 PM</a:t>
             </a:fld>
             <a:endParaRPr lang="en-US" dirty="0"/>
           </a:p>
@@ -10266,7 +10266,7 @@
           <a:p>
             <a:fld id="{38EEC551-8CDA-4EB6-89BB-2A86C9F091C8}" type="datetime8">
               <a:rPr lang="en-US" smtClean="0"/>
-              <a:t>4/8/2022 8:35 AM</a:t>
+              <a:t>11/17/2022 3:04 PM</a:t>
             </a:fld>
             <a:endParaRPr lang="en-US" dirty="0"/>
           </a:p>
@@ -10447,7 +10447,7 @@
           <a:p>
             <a:fld id="{38EEC551-8CDA-4EB6-89BB-2A86C9F091C8}" type="datetime8">
               <a:rPr lang="en-US" smtClean="0"/>
-              <a:t>4/8/2022 8:35 AM</a:t>
+              <a:t>11/17/2022 3:04 PM</a:t>
             </a:fld>
             <a:endParaRPr lang="en-US" dirty="0"/>
           </a:p>
@@ -10628,7 +10628,7 @@
           <a:p>
             <a:fld id="{38EEC551-8CDA-4EB6-89BB-2A86C9F091C8}" type="datetime8">
               <a:rPr lang="en-US" smtClean="0"/>
-              <a:t>4/8/2022 8:35 AM</a:t>
+              <a:t>11/17/2022 3:04 PM</a:t>
             </a:fld>
             <a:endParaRPr lang="en-US" dirty="0"/>
           </a:p>
@@ -10809,7 +10809,7 @@
           <a:p>
             <a:fld id="{38EEC551-8CDA-4EB6-89BB-2A86C9F091C8}" type="datetime8">
               <a:rPr lang="en-US" smtClean="0"/>
-              <a:t>4/8/2022 8:35 AM</a:t>
+              <a:t>11/17/2022 3:04 PM</a:t>
             </a:fld>
             <a:endParaRPr lang="en-US" dirty="0"/>
           </a:p>
@@ -10990,7 +10990,7 @@
           <a:p>
             <a:fld id="{38EEC551-8CDA-4EB6-89BB-2A86C9F091C8}" type="datetime8">
               <a:rPr lang="en-US" smtClean="0"/>
-              <a:t>4/8/2022 8:35 AM</a:t>
+              <a:t>11/17/2022 3:04 PM</a:t>
             </a:fld>
             <a:endParaRPr lang="en-US" dirty="0"/>
           </a:p>
@@ -11332,7 +11332,7 @@
           <a:p>
             <a:fld id="{38EEC551-8CDA-4EB6-89BB-2A86C9F091C8}" type="datetime8">
               <a:rPr lang="en-US" smtClean="0"/>
-              <a:t>4/8/2022 8:35 AM</a:t>
+              <a:t>11/17/2022 3:04 PM</a:t>
             </a:fld>
             <a:endParaRPr lang="en-US" dirty="0"/>
           </a:p>
@@ -11513,7 +11513,7 @@
           <a:p>
             <a:fld id="{38EEC551-8CDA-4EB6-89BB-2A86C9F091C8}" type="datetime8">
               <a:rPr lang="en-US" smtClean="0"/>
-              <a:t>4/8/2022 8:35 AM</a:t>
+              <a:t>11/17/2022 3:04 PM</a:t>
             </a:fld>
             <a:endParaRPr lang="en-US" dirty="0"/>
           </a:p>
@@ -11694,7 +11694,7 @@
           <a:p>
             <a:fld id="{38EEC551-8CDA-4EB6-89BB-2A86C9F091C8}" type="datetime8">
               <a:rPr lang="en-US" smtClean="0"/>
-              <a:t>4/8/2022 8:35 AM</a:t>
+              <a:t>11/17/2022 3:04 PM</a:t>
             </a:fld>
             <a:endParaRPr lang="en-US" dirty="0"/>
           </a:p>
@@ -11875,7 +11875,7 @@
           <a:p>
             <a:fld id="{38EEC551-8CDA-4EB6-89BB-2A86C9F091C8}" type="datetime8">
               <a:rPr lang="en-US" smtClean="0"/>
-              <a:t>4/8/2022 8:35 AM</a:t>
+              <a:t>11/17/2022 3:04 PM</a:t>
             </a:fld>
             <a:endParaRPr lang="en-US" dirty="0"/>
           </a:p>
@@ -12056,7 +12056,7 @@
           <a:p>
             <a:fld id="{38EEC551-8CDA-4EB6-89BB-2A86C9F091C8}" type="datetime8">
               <a:rPr lang="en-US" smtClean="0"/>
-              <a:t>4/8/2022 8:35 AM</a:t>
+              <a:t>11/17/2022 3:04 PM</a:t>
             </a:fld>
             <a:endParaRPr lang="en-US" dirty="0"/>
           </a:p>
@@ -12237,7 +12237,7 @@
           <a:p>
             <a:fld id="{38EEC551-8CDA-4EB6-89BB-2A86C9F091C8}" type="datetime8">
               <a:rPr lang="en-US" smtClean="0"/>
-              <a:t>4/8/2022 8:35 AM</a:t>
+              <a:t>11/17/2022 3:04 PM</a:t>
             </a:fld>
             <a:endParaRPr lang="en-US" dirty="0"/>
           </a:p>
@@ -13522,7 +13522,7 @@
           <a:p>
             <a:fld id="{AFAAA849-1D6E-40B2-B057-39C83678EF33}" type="datetimeFigureOut">
               <a:rPr lang="en-US" smtClean="0"/>
-              <a:t>4/8/2022</a:t>
+              <a:t>11/17/2022</a:t>
             </a:fld>
             <a:endParaRPr lang="en-US"/>
           </a:p>
@@ -13720,7 +13720,7 @@
           <a:p>
             <a:fld id="{AFAAA849-1D6E-40B2-B057-39C83678EF33}" type="datetimeFigureOut">
               <a:rPr lang="en-US" smtClean="0"/>
-              <a:t>4/8/2022</a:t>
+              <a:t>11/17/2022</a:t>
             </a:fld>
             <a:endParaRPr lang="en-US"/>
           </a:p>
@@ -13928,7 +13928,7 @@
           <a:p>
             <a:fld id="{AFAAA849-1D6E-40B2-B057-39C83678EF33}" type="datetimeFigureOut">
               <a:rPr lang="en-US" smtClean="0"/>
-              <a:t>4/8/2022</a:t>
+              <a:t>11/17/2022</a:t>
             </a:fld>
             <a:endParaRPr lang="en-US"/>
           </a:p>
@@ -15187,7 +15187,7 @@
           <a:p>
             <a:fld id="{0A627400-D089-7447-864B-77479EBD4214}" type="datetimeFigureOut">
               <a:rPr lang="en-US" smtClean="0"/>
-              <a:t>4/8/2022</a:t>
+              <a:t>11/17/2022</a:t>
             </a:fld>
             <a:endParaRPr lang="en-US"/>
           </a:p>
@@ -15385,7 +15385,7 @@
           <a:p>
             <a:fld id="{0A627400-D089-7447-864B-77479EBD4214}" type="datetimeFigureOut">
               <a:rPr lang="en-US" smtClean="0"/>
-              <a:t>4/8/2022</a:t>
+              <a:t>11/17/2022</a:t>
             </a:fld>
             <a:endParaRPr lang="en-US"/>
           </a:p>
@@ -15583,7 +15583,7 @@
           <a:p>
             <a:fld id="{AFAAA849-1D6E-40B2-B057-39C83678EF33}" type="datetimeFigureOut">
               <a:rPr lang="en-US" smtClean="0"/>
-              <a:t>4/8/2022</a:t>
+              <a:t>11/17/2022</a:t>
             </a:fld>
             <a:endParaRPr lang="en-US"/>
           </a:p>
@@ -15858,7 +15858,7 @@
           <a:p>
             <a:fld id="{0A627400-D089-7447-864B-77479EBD4214}" type="datetimeFigureOut">
               <a:rPr lang="en-US" smtClean="0"/>
-              <a:t>4/8/2022</a:t>
+              <a:t>11/17/2022</a:t>
             </a:fld>
             <a:endParaRPr lang="en-US"/>
           </a:p>
@@ -16126,7 +16126,7 @@
           <a:p>
             <a:fld id="{0A627400-D089-7447-864B-77479EBD4214}" type="datetimeFigureOut">
               <a:rPr lang="en-US" smtClean="0"/>
-              <a:t>4/8/2022</a:t>
+              <a:t>11/17/2022</a:t>
             </a:fld>
             <a:endParaRPr lang="en-US"/>
           </a:p>
@@ -16538,7 +16538,7 @@
           <a:p>
             <a:fld id="{0A627400-D089-7447-864B-77479EBD4214}" type="datetimeFigureOut">
               <a:rPr lang="en-US" smtClean="0"/>
-              <a:t>4/8/2022</a:t>
+              <a:t>11/17/2022</a:t>
             </a:fld>
             <a:endParaRPr lang="en-US"/>
           </a:p>
@@ -16744,7 +16744,7 @@
           <a:p>
             <a:fld id="{0A627400-D089-7447-864B-77479EBD4214}" type="datetimeFigureOut">
               <a:rPr lang="en-US" smtClean="0"/>
-              <a:t>4/8/2022</a:t>
+              <a:t>11/17/2022</a:t>
             </a:fld>
             <a:endParaRPr lang="en-US"/>
           </a:p>
@@ -16858,7 +16858,7 @@
             <a:fld id="{0A627400-D089-7447-864B-77479EBD4214}" type="datetimeFigureOut">
               <a:rPr lang="en-US" smtClean="0"/>
               <a:pPr/>
-              <a:t>4/8/2022</a:t>
+              <a:t>11/17/2022</a:t>
             </a:fld>
             <a:endParaRPr lang="en-US"/>
           </a:p>
@@ -17023,7 +17023,7 @@
             <a:fld id="{0A627400-D089-7447-864B-77479EBD4214}" type="datetimeFigureOut">
               <a:rPr lang="en-US" smtClean="0"/>
               <a:pPr/>
-              <a:t>4/8/2022</a:t>
+              <a:t>11/17/2022</a:t>
             </a:fld>
             <a:endParaRPr lang="en-US"/>
           </a:p>
@@ -17187,7 +17187,7 @@
           <a:p>
             <a:fld id="{0A627400-D089-7447-864B-77479EBD4214}" type="datetimeFigureOut">
               <a:rPr lang="en-US" smtClean="0"/>
-              <a:t>4/8/2022</a:t>
+              <a:t>11/17/2022</a:t>
             </a:fld>
             <a:endParaRPr lang="en-US"/>
           </a:p>
@@ -17758,7 +17758,7 @@
           <a:p>
             <a:fld id="{0A627400-D089-7447-864B-77479EBD4214}" type="datetimeFigureOut">
               <a:rPr lang="en-US" smtClean="0"/>
-              <a:t>4/8/2022</a:t>
+              <a:t>11/17/2022</a:t>
             </a:fld>
             <a:endParaRPr lang="en-US"/>
           </a:p>
@@ -18069,7 +18069,7 @@
           <a:p>
             <a:fld id="{0A627400-D089-7447-864B-77479EBD4214}" type="datetimeFigureOut">
               <a:rPr lang="en-US" smtClean="0"/>
-              <a:t>4/8/2022</a:t>
+              <a:t>11/17/2022</a:t>
             </a:fld>
             <a:endParaRPr lang="en-US"/>
           </a:p>
@@ -18344,7 +18344,7 @@
           <a:p>
             <a:fld id="{AFAAA849-1D6E-40B2-B057-39C83678EF33}" type="datetimeFigureOut">
               <a:rPr lang="en-US" smtClean="0"/>
-              <a:t>4/8/2022</a:t>
+              <a:t>11/17/2022</a:t>
             </a:fld>
             <a:endParaRPr lang="en-US"/>
           </a:p>
@@ -18632,7 +18632,7 @@
           <a:p>
             <a:fld id="{0A627400-D089-7447-864B-77479EBD4214}" type="datetimeFigureOut">
               <a:rPr lang="en-US" smtClean="0"/>
-              <a:t>4/8/2022</a:t>
+              <a:t>11/17/2022</a:t>
             </a:fld>
             <a:endParaRPr lang="en-US"/>
           </a:p>
@@ -19813,7 +19813,7 @@
           <a:p>
             <a:fld id="{0A627400-D089-7447-864B-77479EBD4214}" type="datetimeFigureOut">
               <a:rPr lang="en-US" smtClean="0"/>
-              <a:t>4/8/2022</a:t>
+              <a:t>11/17/2022</a:t>
             </a:fld>
             <a:endParaRPr lang="en-US"/>
           </a:p>
@@ -20011,7 +20011,7 @@
           <a:p>
             <a:fld id="{0A627400-D089-7447-864B-77479EBD4214}" type="datetimeFigureOut">
               <a:rPr lang="en-US" smtClean="0"/>
-              <a:t>4/8/2022</a:t>
+              <a:t>11/17/2022</a:t>
             </a:fld>
             <a:endParaRPr lang="en-US"/>
           </a:p>
@@ -20286,7 +20286,7 @@
           <a:p>
             <a:fld id="{0A627400-D089-7447-864B-77479EBD4214}" type="datetimeFigureOut">
               <a:rPr lang="en-US" smtClean="0"/>
-              <a:t>4/8/2022</a:t>
+              <a:t>11/17/2022</a:t>
             </a:fld>
             <a:endParaRPr lang="en-US"/>
           </a:p>
@@ -20551,7 +20551,7 @@
           <a:p>
             <a:fld id="{0A627400-D089-7447-864B-77479EBD4214}" type="datetimeFigureOut">
               <a:rPr lang="en-US" smtClean="0"/>
-              <a:t>4/8/2022</a:t>
+              <a:t>11/17/2022</a:t>
             </a:fld>
             <a:endParaRPr lang="en-US"/>
           </a:p>
@@ -20963,7 +20963,7 @@
           <a:p>
             <a:fld id="{0A627400-D089-7447-864B-77479EBD4214}" type="datetimeFigureOut">
               <a:rPr lang="en-US" smtClean="0"/>
-              <a:t>4/8/2022</a:t>
+              <a:t>11/17/2022</a:t>
             </a:fld>
             <a:endParaRPr lang="en-US"/>
           </a:p>
@@ -21169,7 +21169,7 @@
           <a:p>
             <a:fld id="{0A627400-D089-7447-864B-77479EBD4214}" type="datetimeFigureOut">
               <a:rPr lang="en-US" smtClean="0"/>
-              <a:t>4/8/2022</a:t>
+              <a:t>11/17/2022</a:t>
             </a:fld>
             <a:endParaRPr lang="en-US"/>
           </a:p>
@@ -21283,7 +21283,7 @@
             <a:fld id="{0A627400-D089-7447-864B-77479EBD4214}" type="datetimeFigureOut">
               <a:rPr lang="en-US" smtClean="0"/>
               <a:pPr/>
-              <a:t>4/8/2022</a:t>
+              <a:t>11/17/2022</a:t>
             </a:fld>
             <a:endParaRPr lang="en-US"/>
           </a:p>
@@ -21448,7 +21448,7 @@
             <a:fld id="{0A627400-D089-7447-864B-77479EBD4214}" type="datetimeFigureOut">
               <a:rPr lang="en-US" smtClean="0"/>
               <a:pPr/>
-              <a:t>4/8/2022</a:t>
+              <a:t>11/17/2022</a:t>
             </a:fld>
             <a:endParaRPr lang="en-US"/>
           </a:p>
@@ -21736,7 +21736,7 @@
           <a:p>
             <a:fld id="{AFAAA849-1D6E-40B2-B057-39C83678EF33}" type="datetimeFigureOut">
               <a:rPr lang="en-US" smtClean="0"/>
-              <a:t>4/8/2022</a:t>
+              <a:t>11/17/2022</a:t>
             </a:fld>
             <a:endParaRPr lang="en-US"/>
           </a:p>
@@ -21877,7 +21877,7 @@
           <a:p>
             <a:fld id="{0A627400-D089-7447-864B-77479EBD4214}" type="datetimeFigureOut">
               <a:rPr lang="en-US" smtClean="0"/>
-              <a:t>4/8/2022</a:t>
+              <a:t>11/17/2022</a:t>
             </a:fld>
             <a:endParaRPr lang="en-US"/>
           </a:p>
@@ -21990,7 +21990,7 @@
           <a:p>
             <a:fld id="{0A627400-D089-7447-864B-77479EBD4214}" type="datetimeFigureOut">
               <a:rPr lang="en-US" smtClean="0"/>
-              <a:t>4/8/2022</a:t>
+              <a:t>11/17/2022</a:t>
             </a:fld>
             <a:endParaRPr lang="en-US"/>
           </a:p>
@@ -22301,7 +22301,7 @@
           <a:p>
             <a:fld id="{0A627400-D089-7447-864B-77479EBD4214}" type="datetimeFigureOut">
               <a:rPr lang="en-US" smtClean="0"/>
-              <a:t>4/8/2022</a:t>
+              <a:t>11/17/2022</a:t>
             </a:fld>
             <a:endParaRPr lang="en-US"/>
           </a:p>
@@ -22589,7 +22589,7 @@
           <a:p>
             <a:fld id="{0A627400-D089-7447-864B-77479EBD4214}" type="datetimeFigureOut">
               <a:rPr lang="en-US" smtClean="0"/>
-              <a:t>4/8/2022</a:t>
+              <a:t>11/17/2022</a:t>
             </a:fld>
             <a:endParaRPr lang="en-US"/>
           </a:p>
@@ -24506,7 +24506,7 @@
           <a:p>
             <a:fld id="{AFAAA849-1D6E-40B2-B057-39C83678EF33}" type="datetimeFigureOut">
               <a:rPr lang="en-US" smtClean="0"/>
-              <a:t>4/8/2022</a:t>
+              <a:t>11/17/2022</a:t>
             </a:fld>
             <a:endParaRPr lang="en-US"/>
           </a:p>
@@ -25538,7 +25538,7 @@
           <a:p>
             <a:fld id="{AFAAA849-1D6E-40B2-B057-39C83678EF33}" type="datetimeFigureOut">
               <a:rPr lang="en-US" smtClean="0"/>
-              <a:t>4/8/2022</a:t>
+              <a:t>11/17/2022</a:t>
             </a:fld>
             <a:endParaRPr lang="en-US"/>
           </a:p>
@@ -25651,7 +25651,7 @@
           <a:p>
             <a:fld id="{AFAAA849-1D6E-40B2-B057-39C83678EF33}" type="datetimeFigureOut">
               <a:rPr lang="en-US" smtClean="0"/>
-              <a:t>4/8/2022</a:t>
+              <a:t>11/17/2022</a:t>
             </a:fld>
             <a:endParaRPr lang="en-US"/>
           </a:p>
@@ -25962,7 +25962,7 @@
           <a:p>
             <a:fld id="{AFAAA849-1D6E-40B2-B057-39C83678EF33}" type="datetimeFigureOut">
               <a:rPr lang="en-US" smtClean="0"/>
-              <a:t>4/8/2022</a:t>
+              <a:t>11/17/2022</a:t>
             </a:fld>
             <a:endParaRPr lang="en-US"/>
           </a:p>
@@ -26250,7 +26250,7 @@
           <a:p>
             <a:fld id="{AFAAA849-1D6E-40B2-B057-39C83678EF33}" type="datetimeFigureOut">
               <a:rPr lang="en-US" smtClean="0"/>
-              <a:t>4/8/2022</a:t>
+              <a:t>11/17/2022</a:t>
             </a:fld>
             <a:endParaRPr lang="en-US"/>
           </a:p>
@@ -26491,7 +26491,7 @@
           <a:p>
             <a:fld id="{AFAAA849-1D6E-40B2-B057-39C83678EF33}" type="datetimeFigureOut">
               <a:rPr lang="en-US" smtClean="0"/>
-              <a:t>4/8/2022</a:t>
+              <a:t>11/17/2022</a:t>
             </a:fld>
             <a:endParaRPr lang="en-US"/>
           </a:p>
@@ -27716,7 +27716,7 @@
             <a:fld id="{0A627400-D089-7447-864B-77479EBD4214}" type="datetimeFigureOut">
               <a:rPr lang="en-US" smtClean="0"/>
               <a:pPr/>
-              <a:t>4/8/2022</a:t>
+              <a:t>11/17/2022</a:t>
             </a:fld>
             <a:endParaRPr lang="en-US"/>
           </a:p>
@@ -28295,7 +28295,7 @@
             <a:fld id="{0A627400-D089-7447-864B-77479EBD4214}" type="datetimeFigureOut">
               <a:rPr lang="en-US" smtClean="0"/>
               <a:pPr/>
-              <a:t>4/8/2022</a:t>
+              <a:t>11/17/2022</a:t>
             </a:fld>
             <a:endParaRPr lang="en-US"/>
           </a:p>
@@ -30564,7 +30564,7 @@
                 </a:solidFill>
                 <a:latin typeface="Segoe UI"/>
               </a:rPr>
-              <a:t>.NET CORE</a:t>
+              <a:t>.NET</a:t>
             </a:r>
           </a:p>
         </p:txBody>
@@ -38627,7 +38627,7 @@
                   </a:gradFill>
                   <a:latin typeface="Calibri" panose="020F0502020204030204"/>
                 </a:rPr>
-                <a:t> .NET Core BCL</a:t>
+                <a:t> .NET BCL</a:t>
               </a:r>
             </a:p>
           </p:txBody>
@@ -41773,7 +41773,7 @@
           <a:p>
             <a:r>
               <a:rPr lang="en-US" b="1" dirty="0"/>
-              <a:t>.NET Core is an implementation </a:t>
+              <a:t>.NET 7 is an implementation </a:t>
             </a:r>
             <a:r>
               <a:rPr lang="en-US" dirty="0"/>
@@ -41818,7 +41818,7 @@
           <a:p>
             <a:r>
               <a:rPr lang="en-US" b="1" dirty="0"/>
-              <a:t>.NET Core can be updated independently</a:t>
+              <a:t>.NET 7 can be updated independently</a:t>
             </a:r>
           </a:p>
           <a:p>
@@ -41847,7 +41847,7 @@
           <a:p>
             <a:r>
               <a:rPr lang="en-US" dirty="0"/>
-              <a:t>.NET Core and .NET Standard</a:t>
+              <a:t>.NET 7 and .NET Standard</a:t>
             </a:r>
           </a:p>
         </p:txBody>
@@ -46964,324 +46964,6 @@
   <p:clrMapOvr>
     <a:masterClrMapping/>
   </p:clrMapOvr>
-  <p:timing>
-    <p:tnLst>
-      <p:par>
-        <p:cTn id="1" dur="indefinite" restart="never" nodeType="tmRoot">
-          <p:childTnLst>
-            <p:seq concurrent="1" nextAc="seek">
-              <p:cTn id="2" dur="indefinite" nodeType="mainSeq">
-                <p:childTnLst>
-                  <p:par>
-                    <p:cTn id="3" fill="hold">
-                      <p:stCondLst>
-                        <p:cond delay="indefinite"/>
-                      </p:stCondLst>
-                      <p:childTnLst>
-                        <p:par>
-                          <p:cTn id="4" fill="hold">
-                            <p:stCondLst>
-                              <p:cond delay="0"/>
-                            </p:stCondLst>
-                            <p:childTnLst>
-                              <p:par>
-                                <p:cTn id="5" presetID="10" presetClass="entr" presetSubtype="0" fill="hold" nodeType="clickEffect">
-                                  <p:stCondLst>
-                                    <p:cond delay="0"/>
-                                  </p:stCondLst>
-                                  <p:childTnLst>
-                                    <p:set>
-                                      <p:cBhvr>
-                                        <p:cTn id="6" dur="1" fill="hold">
-                                          <p:stCondLst>
-                                            <p:cond delay="0"/>
-                                          </p:stCondLst>
-                                        </p:cTn>
-                                        <p:tgtEl>
-                                          <p:spTgt spid="55"/>
-                                        </p:tgtEl>
-                                        <p:attrNameLst>
-                                          <p:attrName>style.visibility</p:attrName>
-                                        </p:attrNameLst>
-                                      </p:cBhvr>
-                                      <p:to>
-                                        <p:strVal val="visible"/>
-                                      </p:to>
-                                    </p:set>
-                                    <p:animEffect transition="in" filter="fade">
-                                      <p:cBhvr>
-                                        <p:cTn id="7" dur="500"/>
-                                        <p:tgtEl>
-                                          <p:spTgt spid="55"/>
-                                        </p:tgtEl>
-                                      </p:cBhvr>
-                                    </p:animEffect>
-                                  </p:childTnLst>
-                                </p:cTn>
-                              </p:par>
-                            </p:childTnLst>
-                          </p:cTn>
-                        </p:par>
-                      </p:childTnLst>
-                    </p:cTn>
-                  </p:par>
-                  <p:par>
-                    <p:cTn id="8" fill="hold">
-                      <p:stCondLst>
-                        <p:cond delay="indefinite"/>
-                      </p:stCondLst>
-                      <p:childTnLst>
-                        <p:par>
-                          <p:cTn id="9" fill="hold">
-                            <p:stCondLst>
-                              <p:cond delay="0"/>
-                            </p:stCondLst>
-                            <p:childTnLst>
-                              <p:par>
-                                <p:cTn id="10" presetID="10" presetClass="entr" presetSubtype="0" fill="hold" nodeType="clickEffect">
-                                  <p:stCondLst>
-                                    <p:cond delay="0"/>
-                                  </p:stCondLst>
-                                  <p:childTnLst>
-                                    <p:set>
-                                      <p:cBhvr>
-                                        <p:cTn id="11" dur="1" fill="hold">
-                                          <p:stCondLst>
-                                            <p:cond delay="0"/>
-                                          </p:stCondLst>
-                                        </p:cTn>
-                                        <p:tgtEl>
-                                          <p:spTgt spid="47"/>
-                                        </p:tgtEl>
-                                        <p:attrNameLst>
-                                          <p:attrName>style.visibility</p:attrName>
-                                        </p:attrNameLst>
-                                      </p:cBhvr>
-                                      <p:to>
-                                        <p:strVal val="visible"/>
-                                      </p:to>
-                                    </p:set>
-                                    <p:animEffect transition="in" filter="fade">
-                                      <p:cBhvr>
-                                        <p:cTn id="12" dur="500"/>
-                                        <p:tgtEl>
-                                          <p:spTgt spid="47"/>
-                                        </p:tgtEl>
-                                      </p:cBhvr>
-                                    </p:animEffect>
-                                  </p:childTnLst>
-                                </p:cTn>
-                              </p:par>
-                            </p:childTnLst>
-                          </p:cTn>
-                        </p:par>
-                      </p:childTnLst>
-                    </p:cTn>
-                  </p:par>
-                  <p:par>
-                    <p:cTn id="13" fill="hold">
-                      <p:stCondLst>
-                        <p:cond delay="indefinite"/>
-                      </p:stCondLst>
-                      <p:childTnLst>
-                        <p:par>
-                          <p:cTn id="14" fill="hold">
-                            <p:stCondLst>
-                              <p:cond delay="0"/>
-                            </p:stCondLst>
-                            <p:childTnLst>
-                              <p:par>
-                                <p:cTn id="15" presetID="10" presetClass="entr" presetSubtype="0" fill="hold" grpId="0" nodeType="clickEffect">
-                                  <p:stCondLst>
-                                    <p:cond delay="0"/>
-                                  </p:stCondLst>
-                                  <p:childTnLst>
-                                    <p:set>
-                                      <p:cBhvr>
-                                        <p:cTn id="16" dur="1" fill="hold">
-                                          <p:stCondLst>
-                                            <p:cond delay="0"/>
-                                          </p:stCondLst>
-                                        </p:cTn>
-                                        <p:tgtEl>
-                                          <p:spTgt spid="66"/>
-                                        </p:tgtEl>
-                                        <p:attrNameLst>
-                                          <p:attrName>style.visibility</p:attrName>
-                                        </p:attrNameLst>
-                                      </p:cBhvr>
-                                      <p:to>
-                                        <p:strVal val="visible"/>
-                                      </p:to>
-                                    </p:set>
-                                    <p:animEffect transition="in" filter="fade">
-                                      <p:cBhvr>
-                                        <p:cTn id="17" dur="500"/>
-                                        <p:tgtEl>
-                                          <p:spTgt spid="66"/>
-                                        </p:tgtEl>
-                                      </p:cBhvr>
-                                    </p:animEffect>
-                                  </p:childTnLst>
-                                </p:cTn>
-                              </p:par>
-                              <p:par>
-                                <p:cTn id="18" presetID="10" presetClass="entr" presetSubtype="0" fill="hold" grpId="0" nodeType="withEffect">
-                                  <p:stCondLst>
-                                    <p:cond delay="0"/>
-                                  </p:stCondLst>
-                                  <p:childTnLst>
-                                    <p:set>
-                                      <p:cBhvr>
-                                        <p:cTn id="19" dur="1" fill="hold">
-                                          <p:stCondLst>
-                                            <p:cond delay="0"/>
-                                          </p:stCondLst>
-                                        </p:cTn>
-                                        <p:tgtEl>
-                                          <p:spTgt spid="65"/>
-                                        </p:tgtEl>
-                                        <p:attrNameLst>
-                                          <p:attrName>style.visibility</p:attrName>
-                                        </p:attrNameLst>
-                                      </p:cBhvr>
-                                      <p:to>
-                                        <p:strVal val="visible"/>
-                                      </p:to>
-                                    </p:set>
-                                    <p:animEffect transition="in" filter="fade">
-                                      <p:cBhvr>
-                                        <p:cTn id="20" dur="500"/>
-                                        <p:tgtEl>
-                                          <p:spTgt spid="65"/>
-                                        </p:tgtEl>
-                                      </p:cBhvr>
-                                    </p:animEffect>
-                                  </p:childTnLst>
-                                </p:cTn>
-                              </p:par>
-                            </p:childTnLst>
-                          </p:cTn>
-                        </p:par>
-                      </p:childTnLst>
-                    </p:cTn>
-                  </p:par>
-                  <p:par>
-                    <p:cTn id="21" fill="hold">
-                      <p:stCondLst>
-                        <p:cond delay="indefinite"/>
-                      </p:stCondLst>
-                      <p:childTnLst>
-                        <p:par>
-                          <p:cTn id="22" fill="hold">
-                            <p:stCondLst>
-                              <p:cond delay="0"/>
-                            </p:stCondLst>
-                            <p:childTnLst>
-                              <p:par>
-                                <p:cTn id="23" presetID="10" presetClass="entr" presetSubtype="0" fill="hold" grpId="0" nodeType="clickEffect">
-                                  <p:stCondLst>
-                                    <p:cond delay="0"/>
-                                  </p:stCondLst>
-                                  <p:childTnLst>
-                                    <p:set>
-                                      <p:cBhvr>
-                                        <p:cTn id="24" dur="1" fill="hold">
-                                          <p:stCondLst>
-                                            <p:cond delay="0"/>
-                                          </p:stCondLst>
-                                        </p:cTn>
-                                        <p:tgtEl>
-                                          <p:spTgt spid="67"/>
-                                        </p:tgtEl>
-                                        <p:attrNameLst>
-                                          <p:attrName>style.visibility</p:attrName>
-                                        </p:attrNameLst>
-                                      </p:cBhvr>
-                                      <p:to>
-                                        <p:strVal val="visible"/>
-                                      </p:to>
-                                    </p:set>
-                                    <p:animEffect transition="in" filter="fade">
-                                      <p:cBhvr>
-                                        <p:cTn id="25" dur="500"/>
-                                        <p:tgtEl>
-                                          <p:spTgt spid="67"/>
-                                        </p:tgtEl>
-                                      </p:cBhvr>
-                                    </p:animEffect>
-                                  </p:childTnLst>
-                                </p:cTn>
-                              </p:par>
-                              <p:par>
-                                <p:cTn id="26" presetID="10" presetClass="entr" presetSubtype="0" fill="hold" grpId="0" nodeType="withEffect">
-                                  <p:stCondLst>
-                                    <p:cond delay="0"/>
-                                  </p:stCondLst>
-                                  <p:childTnLst>
-                                    <p:set>
-                                      <p:cBhvr>
-                                        <p:cTn id="27" dur="1" fill="hold">
-                                          <p:stCondLst>
-                                            <p:cond delay="0"/>
-                                          </p:stCondLst>
-                                        </p:cTn>
-                                        <p:tgtEl>
-                                          <p:spTgt spid="68"/>
-                                        </p:tgtEl>
-                                        <p:attrNameLst>
-                                          <p:attrName>style.visibility</p:attrName>
-                                        </p:attrNameLst>
-                                      </p:cBhvr>
-                                      <p:to>
-                                        <p:strVal val="visible"/>
-                                      </p:to>
-                                    </p:set>
-                                    <p:animEffect transition="in" filter="fade">
-                                      <p:cBhvr>
-                                        <p:cTn id="28" dur="500"/>
-                                        <p:tgtEl>
-                                          <p:spTgt spid="68"/>
-                                        </p:tgtEl>
-                                      </p:cBhvr>
-                                    </p:animEffect>
-                                  </p:childTnLst>
-                                </p:cTn>
-                              </p:par>
-                            </p:childTnLst>
-                          </p:cTn>
-                        </p:par>
-                      </p:childTnLst>
-                    </p:cTn>
-                  </p:par>
-                </p:childTnLst>
-              </p:cTn>
-              <p:prevCondLst>
-                <p:cond evt="onPrev" delay="0">
-                  <p:tgtEl>
-                    <p:sldTgt/>
-                  </p:tgtEl>
-                </p:cond>
-              </p:prevCondLst>
-              <p:nextCondLst>
-                <p:cond evt="onNext" delay="0">
-                  <p:tgtEl>
-                    <p:sldTgt/>
-                  </p:tgtEl>
-                </p:cond>
-              </p:nextCondLst>
-            </p:seq>
-          </p:childTnLst>
-        </p:cTn>
-      </p:par>
-    </p:tnLst>
-    <p:bldLst>
-      <p:bldP spid="65" grpId="0" animBg="1"/>
-      <p:bldP spid="66" grpId="0" animBg="1"/>
-      <p:bldP spid="67" grpId="0" animBg="1"/>
-      <p:bldP spid="68" grpId="0" animBg="1"/>
-    </p:bldLst>
-  </p:timing>
 </p:sld>
 </file>
 
@@ -51106,13 +50788,21 @@
           <a:p>
             <a:r>
               <a:rPr lang="en-US" dirty="0"/>
-              <a:t>Extended to cover intersection between .NET Framework and .NET 6</a:t>
+              <a:t>Extended to cover intersection between .NET Framework and .NET 7</a:t>
             </a:r>
           </a:p>
           <a:p>
             <a:r>
               <a:rPr lang="en-US" dirty="0"/>
-              <a:t>Makes .NET 6 bigger as it implements more </a:t>
+              <a:t>Makes .</a:t>
+            </a:r>
+            <a:r>
+              <a:rPr lang="en-US"/>
+              <a:t>NET 7 </a:t>
+            </a:r>
+            <a:r>
+              <a:rPr lang="en-US" dirty="0"/>
+              <a:t>bigger as it implements more </a:t>
             </a:r>
             <a:r>
               <a:rPr lang="en-US" dirty="0" err="1"/>

</xml_diff>